<commit_message>
Updated powerpoint and some code
</commit_message>
<xml_diff>
--- a/Project Starfighter 1.2.pptx
+++ b/Project Starfighter 1.2.pptx
@@ -10,14 +10,14 @@
     <p:sldId id="291" r:id="rId4"/>
     <p:sldId id="279" r:id="rId5"/>
     <p:sldId id="274" r:id="rId6"/>
-    <p:sldId id="287" r:id="rId7"/>
-    <p:sldId id="277" r:id="rId8"/>
-    <p:sldId id="284" r:id="rId9"/>
-    <p:sldId id="292" r:id="rId10"/>
-    <p:sldId id="282" r:id="rId11"/>
-    <p:sldId id="288" r:id="rId12"/>
-    <p:sldId id="289" r:id="rId13"/>
-    <p:sldId id="290" r:id="rId14"/>
+    <p:sldId id="293" r:id="rId7"/>
+    <p:sldId id="294" r:id="rId8"/>
+    <p:sldId id="295" r:id="rId9"/>
+    <p:sldId id="287" r:id="rId10"/>
+    <p:sldId id="277" r:id="rId11"/>
+    <p:sldId id="284" r:id="rId12"/>
+    <p:sldId id="292" r:id="rId13"/>
+    <p:sldId id="282" r:id="rId14"/>
     <p:sldId id="269" r:id="rId15"/>
     <p:sldId id="270" r:id="rId16"/>
     <p:sldId id="271" r:id="rId17"/>
@@ -3492,7 +3492,7 @@
           <a:p>
             <a:r>
               <a:rPr lang="en-US" dirty="0" smtClean="0"/>
-              <a:t>Sound Effect Test Code</a:t>
+              <a:t>Lives Test Code</a:t>
             </a:r>
             <a:endParaRPr lang="en-US" dirty="0"/>
           </a:p>
@@ -3516,14 +3516,147 @@
             <a:pPr marL="0" indent="0">
               <a:buNone/>
             </a:pPr>
-            <a:endParaRPr lang="en-US" sz="1800" dirty="0"/>
+            <a:r>
+              <a:rPr lang="en-US" sz="2400" dirty="0"/>
+              <a:t> </a:t>
+            </a:r>
+            <a:endParaRPr lang="en-US" sz="2400" dirty="0" smtClean="0"/>
+          </a:p>
+          <a:p>
+            <a:pPr marL="0" indent="0">
+              <a:buNone/>
+            </a:pPr>
+            <a:r>
+              <a:rPr lang="en-US" sz="2400" dirty="0" err="1"/>
+              <a:t>HudValues</a:t>
+            </a:r>
+            <a:r>
+              <a:rPr lang="en-US" sz="2400" dirty="0"/>
+              <a:t> </a:t>
+            </a:r>
+            <a:r>
+              <a:rPr lang="en-US" sz="2400" dirty="0" err="1"/>
+              <a:t>hud</a:t>
+            </a:r>
+            <a:r>
+              <a:rPr lang="en-US" sz="2400" dirty="0"/>
+              <a:t> = new </a:t>
+            </a:r>
+            <a:r>
+              <a:rPr lang="en-US" sz="2400" dirty="0" err="1"/>
+              <a:t>HudValues</a:t>
+            </a:r>
+            <a:r>
+              <a:rPr lang="en-US" sz="2400" smtClean="0"/>
+              <a:t>();</a:t>
+            </a:r>
+          </a:p>
+          <a:p>
+            <a:pPr marL="0" indent="0">
+              <a:buNone/>
+            </a:pPr>
+            <a:endParaRPr lang="en-US" sz="2400"/>
+          </a:p>
+          <a:p>
+            <a:pPr marL="0" indent="0">
+              <a:buNone/>
+            </a:pPr>
+            <a:r>
+              <a:rPr lang="en-US" sz="2400" dirty="0" smtClean="0"/>
+              <a:t>[</a:t>
+            </a:r>
+            <a:r>
+              <a:rPr lang="en-US" sz="2400" dirty="0" err="1"/>
+              <a:t>TestMethod</a:t>
+            </a:r>
+            <a:r>
+              <a:rPr lang="en-US" sz="2400" dirty="0"/>
+              <a:t>]</a:t>
+            </a:r>
+          </a:p>
+          <a:p>
+            <a:pPr marL="0" indent="0">
+              <a:buNone/>
+            </a:pPr>
+            <a:r>
+              <a:rPr lang="en-US" sz="2400" dirty="0"/>
+              <a:t>        public void </a:t>
+            </a:r>
+            <a:r>
+              <a:rPr lang="en-US" sz="2400" dirty="0" err="1"/>
+              <a:t>LivesValue_Test</a:t>
+            </a:r>
+            <a:r>
+              <a:rPr lang="en-US" sz="2400" dirty="0"/>
+              <a:t>()</a:t>
+            </a:r>
+          </a:p>
+          <a:p>
+            <a:pPr marL="0" indent="0">
+              <a:buNone/>
+            </a:pPr>
+            <a:r>
+              <a:rPr lang="en-US" sz="2400" dirty="0"/>
+              <a:t>        {</a:t>
+            </a:r>
+          </a:p>
+          <a:p>
+            <a:pPr marL="0" indent="0">
+              <a:buNone/>
+            </a:pPr>
+            <a:r>
+              <a:rPr lang="en-US" sz="2400" dirty="0"/>
+              <a:t>            </a:t>
+            </a:r>
+            <a:r>
+              <a:rPr lang="en-US" sz="2400" dirty="0" err="1"/>
+              <a:t>hud.lives</a:t>
+            </a:r>
+            <a:r>
+              <a:rPr lang="en-US" sz="2400" dirty="0"/>
+              <a:t> = 3;</a:t>
+            </a:r>
+          </a:p>
+          <a:p>
+            <a:pPr marL="0" indent="0">
+              <a:buNone/>
+            </a:pPr>
+            <a:r>
+              <a:rPr lang="en-US" sz="2400" dirty="0"/>
+              <a:t>            </a:t>
+            </a:r>
+            <a:r>
+              <a:rPr lang="en-US" sz="2400" dirty="0" err="1"/>
+              <a:t>Assert.AreEqual</a:t>
+            </a:r>
+            <a:r>
+              <a:rPr lang="en-US" sz="2400" dirty="0"/>
+              <a:t>(3, </a:t>
+            </a:r>
+            <a:r>
+              <a:rPr lang="en-US" sz="2400" dirty="0" err="1"/>
+              <a:t>hud.lives</a:t>
+            </a:r>
+            <a:r>
+              <a:rPr lang="en-US" sz="2400" dirty="0"/>
+              <a:t>);</a:t>
+            </a:r>
+          </a:p>
+          <a:p>
+            <a:pPr marL="0" indent="0">
+              <a:buNone/>
+            </a:pPr>
+            <a:r>
+              <a:rPr lang="en-US" sz="2400" dirty="0"/>
+              <a:t>        }</a:t>
+            </a:r>
           </a:p>
         </p:txBody>
       </p:sp>
     </p:spTree>
     <p:extLst>
       <p:ext uri="{BB962C8B-B14F-4D97-AF65-F5344CB8AC3E}">
-        <p14:creationId xmlns:p14="http://schemas.microsoft.com/office/powerpoint/2010/main" val="755878279"/>
+        <p14:creationId xmlns:p14="http://schemas.microsoft.com/office/powerpoint/2010/main" xmlns="" val="3772113046"/>
       </p:ext>
     </p:extLst>
   </p:cSld>
@@ -3559,6 +3692,29 @@
       </p:grpSpPr>
       <p:sp>
         <p:nvSpPr>
+          <p:cNvPr id="2" name="Title 1"/>
+          <p:cNvSpPr>
+            <a:spLocks noGrp="1"/>
+          </p:cNvSpPr>
+          <p:nvPr>
+            <p:ph type="title"/>
+          </p:nvPr>
+        </p:nvSpPr>
+        <p:spPr/>
+        <p:txBody>
+          <a:bodyPr/>
+          <a:lstStyle/>
+          <a:p>
+            <a:r>
+              <a:rPr lang="en-US" dirty="0" smtClean="0"/>
+              <a:t>Score Test Code</a:t>
+            </a:r>
+            <a:endParaRPr lang="en-US" dirty="0"/>
+          </a:p>
+        </p:txBody>
+      </p:sp>
+      <p:sp>
+        <p:nvSpPr>
           <p:cNvPr id="3" name="Content Placeholder 2"/>
           <p:cNvSpPr>
             <a:spLocks noGrp="1"/>
@@ -3569,8 +3725,8 @@
         </p:nvSpPr>
         <p:spPr>
           <a:xfrm>
-            <a:off x="381000" y="152400"/>
-            <a:ext cx="8229600" cy="4525963"/>
+            <a:off x="457200" y="1219200"/>
+            <a:ext cx="8229600" cy="5410200"/>
           </a:xfrm>
         </p:spPr>
         <p:txBody>
@@ -3580,11 +3736,104 @@
             <a:pPr marL="0" indent="0">
               <a:buNone/>
             </a:pPr>
-            <a:endParaRPr lang="en-US" sz="2400" dirty="0" smtClean="0"/>
+            <a:r>
+              <a:rPr lang="en-US" sz="2400" dirty="0"/>
+              <a:t> [</a:t>
+            </a:r>
+            <a:r>
+              <a:rPr lang="en-US" sz="2400" dirty="0" err="1"/>
+              <a:t>TestMethod</a:t>
+            </a:r>
+            <a:r>
+              <a:rPr lang="en-US" sz="2400" dirty="0"/>
+              <a:t>]</a:t>
+            </a:r>
+          </a:p>
+          <a:p>
+            <a:pPr marL="0" indent="0">
+              <a:buNone/>
+            </a:pPr>
+            <a:r>
+              <a:rPr lang="en-US" sz="2400" dirty="0"/>
+              <a:t>        public void </a:t>
+            </a:r>
+            <a:r>
+              <a:rPr lang="en-US" sz="2400" dirty="0" err="1"/>
+              <a:t>ScoreValue_Test</a:t>
+            </a:r>
+            <a:r>
+              <a:rPr lang="en-US" sz="2400" dirty="0"/>
+              <a:t>()</a:t>
+            </a:r>
+          </a:p>
+          <a:p>
+            <a:pPr marL="0" indent="0">
+              <a:buNone/>
+            </a:pPr>
+            <a:r>
+              <a:rPr lang="en-US" sz="2400" dirty="0"/>
+              <a:t>        {</a:t>
+            </a:r>
+          </a:p>
+          <a:p>
+            <a:pPr marL="0" indent="0">
+              <a:buNone/>
+            </a:pPr>
+            <a:r>
+              <a:rPr lang="en-US" sz="2400" dirty="0"/>
+              <a:t>            </a:t>
+            </a:r>
+            <a:r>
+              <a:rPr lang="en-US" sz="2400" dirty="0" err="1"/>
+              <a:t>hud.score</a:t>
+            </a:r>
+            <a:r>
+              <a:rPr lang="en-US" sz="2400" dirty="0"/>
+              <a:t> = 0;</a:t>
+            </a:r>
+          </a:p>
+          <a:p>
+            <a:pPr marL="0" indent="0">
+              <a:buNone/>
+            </a:pPr>
+            <a:r>
+              <a:rPr lang="en-US" sz="2400" dirty="0"/>
+              <a:t>            </a:t>
+            </a:r>
+            <a:r>
+              <a:rPr lang="en-US" sz="2400" dirty="0" err="1"/>
+              <a:t>Assert.AreEqual</a:t>
+            </a:r>
+            <a:r>
+              <a:rPr lang="en-US" sz="2400" dirty="0"/>
+              <a:t>(0, </a:t>
+            </a:r>
+            <a:r>
+              <a:rPr lang="en-US" sz="2400" dirty="0" err="1"/>
+              <a:t>hud.score</a:t>
+            </a:r>
+            <a:r>
+              <a:rPr lang="en-US" sz="2400" dirty="0"/>
+              <a:t>);</a:t>
+            </a:r>
+          </a:p>
+          <a:p>
+            <a:pPr marL="0" indent="0">
+              <a:buNone/>
+            </a:pPr>
+            <a:r>
+              <a:rPr lang="en-US" sz="2400" dirty="0"/>
+              <a:t>        }</a:t>
+            </a:r>
           </a:p>
         </p:txBody>
       </p:sp>
     </p:spTree>
+    <p:extLst>
+      <p:ext uri="{BB962C8B-B14F-4D97-AF65-F5344CB8AC3E}">
+        <p14:creationId xmlns:p14="http://schemas.microsoft.com/office/powerpoint/2010/main" xmlns="" val="755878279"/>
+      </p:ext>
+    </p:extLst>
   </p:cSld>
   <p:clrMapOvr>
     <a:masterClrMapping/>
@@ -3618,6 +3867,29 @@
       </p:grpSpPr>
       <p:sp>
         <p:nvSpPr>
+          <p:cNvPr id="2" name="Title 1"/>
+          <p:cNvSpPr>
+            <a:spLocks noGrp="1"/>
+          </p:cNvSpPr>
+          <p:nvPr>
+            <p:ph type="title"/>
+          </p:nvPr>
+        </p:nvSpPr>
+        <p:spPr/>
+        <p:txBody>
+          <a:bodyPr/>
+          <a:lstStyle/>
+          <a:p>
+            <a:r>
+              <a:rPr lang="en-US" dirty="0" smtClean="0"/>
+              <a:t>Level Test Code</a:t>
+            </a:r>
+            <a:endParaRPr lang="en-US" dirty="0"/>
+          </a:p>
+        </p:txBody>
+      </p:sp>
+      <p:sp>
+        <p:nvSpPr>
           <p:cNvPr id="3" name="Content Placeholder 2"/>
           <p:cNvSpPr>
             <a:spLocks noGrp="1"/>
@@ -3626,12 +3898,7 @@
             <p:ph idx="1"/>
           </p:nvPr>
         </p:nvSpPr>
-        <p:spPr>
-          <a:xfrm>
-            <a:off x="457200" y="0"/>
-            <a:ext cx="8229600" cy="4525963"/>
-          </a:xfrm>
-        </p:spPr>
+        <p:spPr/>
         <p:txBody>
           <a:bodyPr/>
           <a:lstStyle/>
@@ -3639,22 +3906,108 @@
             <a:pPr marL="0" indent="0">
               <a:buNone/>
             </a:pPr>
-            <a:endParaRPr lang="en-US" sz="2200" dirty="0" smtClean="0"/>
+            <a:r>
+              <a:rPr lang="en-US" sz="2400" dirty="0"/>
+              <a:t> [</a:t>
+            </a:r>
+            <a:r>
+              <a:rPr lang="en-US" sz="2400" dirty="0" err="1"/>
+              <a:t>TestMethod</a:t>
+            </a:r>
+            <a:r>
+              <a:rPr lang="en-US" sz="2400" dirty="0"/>
+              <a:t>]</a:t>
+            </a:r>
+          </a:p>
+          <a:p>
+            <a:pPr marL="0" indent="0">
+              <a:buNone/>
+            </a:pPr>
+            <a:r>
+              <a:rPr lang="en-US" sz="2400" dirty="0"/>
+              <a:t>        public void </a:t>
+            </a:r>
+            <a:r>
+              <a:rPr lang="en-US" sz="2400" dirty="0" err="1"/>
+              <a:t>LevelValue_Test</a:t>
+            </a:r>
+            <a:r>
+              <a:rPr lang="en-US" sz="2400" dirty="0"/>
+              <a:t>()</a:t>
+            </a:r>
+          </a:p>
+          <a:p>
+            <a:pPr marL="0" indent="0">
+              <a:buNone/>
+            </a:pPr>
+            <a:r>
+              <a:rPr lang="en-US" sz="2400" dirty="0"/>
+              <a:t>        {</a:t>
+            </a:r>
+          </a:p>
+          <a:p>
+            <a:pPr marL="0" indent="0">
+              <a:buNone/>
+            </a:pPr>
+            <a:r>
+              <a:rPr lang="en-US" sz="2400" dirty="0"/>
+              <a:t>            </a:t>
+            </a:r>
+            <a:r>
+              <a:rPr lang="en-US" sz="2400" dirty="0" err="1"/>
+              <a:t>hud.level</a:t>
+            </a:r>
+            <a:r>
+              <a:rPr lang="en-US" sz="2400" dirty="0"/>
+              <a:t> = 1;</a:t>
+            </a:r>
+          </a:p>
+          <a:p>
+            <a:pPr marL="0" indent="0">
+              <a:buNone/>
+            </a:pPr>
+            <a:r>
+              <a:rPr lang="en-US" sz="2400" dirty="0"/>
+              <a:t>            </a:t>
+            </a:r>
+            <a:r>
+              <a:rPr lang="en-US" sz="2400" dirty="0" err="1"/>
+              <a:t>Assert.AreEqual</a:t>
+            </a:r>
+            <a:r>
+              <a:rPr lang="en-US" sz="2400" dirty="0"/>
+              <a:t>(1, </a:t>
+            </a:r>
+            <a:r>
+              <a:rPr lang="en-US" sz="2400" dirty="0" err="1"/>
+              <a:t>hud.level</a:t>
+            </a:r>
+            <a:r>
+              <a:rPr lang="en-US" sz="2400" dirty="0"/>
+              <a:t>);</a:t>
+            </a:r>
+          </a:p>
+          <a:p>
+            <a:pPr marL="0" indent="0">
+              <a:buNone/>
+            </a:pPr>
+            <a:r>
+              <a:rPr lang="en-US" sz="2400" dirty="0"/>
+              <a:t>        }</a:t>
+            </a:r>
           </a:p>
         </p:txBody>
       </p:sp>
     </p:spTree>
+    <p:extLst>
+      <p:ext uri="{BB962C8B-B14F-4D97-AF65-F5344CB8AC3E}">
+        <p14:creationId xmlns:p14="http://schemas.microsoft.com/office/powerpoint/2010/main" xmlns="" val="2934486822"/>
+      </p:ext>
+    </p:extLst>
   </p:cSld>
   <p:clrMapOvr>
     <a:masterClrMapping/>
   </p:clrMapOvr>
-  <p:timing>
-    <p:tnLst>
-      <p:par>
-        <p:cTn id="1" dur="indefinite" restart="never" nodeType="tmRoot"/>
-      </p:par>
-    </p:tnLst>
-  </p:timing>
 </p:sld>
 </file>
 
@@ -3677,6 +4030,29 @@
       </p:grpSpPr>
       <p:sp>
         <p:nvSpPr>
+          <p:cNvPr id="2" name="Title 1"/>
+          <p:cNvSpPr>
+            <a:spLocks noGrp="1"/>
+          </p:cNvSpPr>
+          <p:nvPr>
+            <p:ph type="title"/>
+          </p:nvPr>
+        </p:nvSpPr>
+        <p:spPr/>
+        <p:txBody>
+          <a:bodyPr/>
+          <a:lstStyle/>
+          <a:p>
+            <a:r>
+              <a:rPr lang="en-US" dirty="0" smtClean="0"/>
+              <a:t>Sound Effect Test Code</a:t>
+            </a:r>
+            <a:endParaRPr lang="en-US" dirty="0"/>
+          </a:p>
+        </p:txBody>
+      </p:sp>
+      <p:sp>
+        <p:nvSpPr>
           <p:cNvPr id="3" name="Content Placeholder 2"/>
           <p:cNvSpPr>
             <a:spLocks noGrp="1"/>
@@ -3685,24 +4061,204 @@
             <p:ph idx="1"/>
           </p:nvPr>
         </p:nvSpPr>
-        <p:spPr>
-          <a:xfrm>
-            <a:off x="457200" y="304800"/>
-            <a:ext cx="8229600" cy="4525963"/>
-          </a:xfrm>
-        </p:spPr>
+        <p:spPr/>
         <p:txBody>
           <a:bodyPr/>
           <a:lstStyle/>
           <a:p>
+            <a:r>
+              <a:rPr lang="en-US" sz="2000" dirty="0" smtClean="0"/>
+              <a:t>[</a:t>
+            </a:r>
+            <a:r>
+              <a:rPr lang="en-US" sz="2000" dirty="0" err="1" smtClean="0"/>
+              <a:t>TestMethod</a:t>
+            </a:r>
+            <a:r>
+              <a:rPr lang="en-US" sz="2000" dirty="0" smtClean="0"/>
+              <a:t>]</a:t>
+            </a:r>
+          </a:p>
+          <a:p>
+            <a:r>
+              <a:rPr lang="en-US" sz="2000" dirty="0" smtClean="0"/>
+              <a:t>        public void </a:t>
+            </a:r>
+            <a:r>
+              <a:rPr lang="en-US" sz="2000" dirty="0" err="1" smtClean="0"/>
+              <a:t>Test_Load</a:t>
+            </a:r>
+            <a:r>
+              <a:rPr lang="en-US" sz="2000" dirty="0" smtClean="0"/>
+              <a:t>()</a:t>
+            </a:r>
+          </a:p>
+          <a:p>
+            <a:r>
+              <a:rPr lang="en-US" sz="2000" dirty="0" smtClean="0"/>
+              <a:t>        {</a:t>
+            </a:r>
+          </a:p>
+          <a:p>
+            <a:r>
+              <a:rPr lang="en-US" sz="2000" dirty="0" smtClean="0"/>
+              <a:t>            string </a:t>
+            </a:r>
+            <a:r>
+              <a:rPr lang="en-US" sz="2000" dirty="0" err="1" smtClean="0"/>
+              <a:t>laserSound</a:t>
+            </a:r>
+            <a:r>
+              <a:rPr lang="en-US" sz="2000" dirty="0" smtClean="0"/>
+              <a:t>= “Laser";</a:t>
+            </a:r>
+            <a:endParaRPr lang="en-US" sz="2000" dirty="0" smtClean="0"/>
+          </a:p>
+          <a:p>
+            <a:r>
+              <a:rPr lang="en-US" sz="2000" dirty="0" smtClean="0"/>
+              <a:t>            </a:t>
+            </a:r>
+            <a:r>
+              <a:rPr lang="en-US" sz="2000" dirty="0" err="1" smtClean="0"/>
+              <a:t>Assert.IsNotNull</a:t>
+            </a:r>
+            <a:r>
+              <a:rPr lang="en-US" sz="2000" dirty="0" smtClean="0"/>
+              <a:t>(</a:t>
+            </a:r>
+            <a:r>
+              <a:rPr lang="en-US" sz="2000" dirty="0" err="1" smtClean="0"/>
+              <a:t>songlocation</a:t>
+            </a:r>
+            <a:r>
+              <a:rPr lang="en-US" sz="2000" dirty="0" smtClean="0"/>
+              <a:t>);</a:t>
+            </a:r>
+          </a:p>
+          <a:p>
+            <a:r>
+              <a:rPr lang="en-US" sz="2000" dirty="0" smtClean="0"/>
+              <a:t>            </a:t>
+            </a:r>
+          </a:p>
+          <a:p>
+            <a:r>
+              <a:rPr lang="en-US" sz="2000" dirty="0" smtClean="0"/>
+              <a:t> </a:t>
+            </a:r>
+            <a:r>
+              <a:rPr lang="en-US" sz="2000" dirty="0" smtClean="0"/>
+              <a:t>           string enemy1Sound</a:t>
+            </a:r>
+            <a:r>
+              <a:rPr lang="en-US" sz="2000" dirty="0" smtClean="0"/>
+              <a:t>= </a:t>
+            </a:r>
+            <a:r>
+              <a:rPr lang="en-US" sz="2000" dirty="0" smtClean="0"/>
+              <a:t>“Enemy1Explosion";</a:t>
+            </a:r>
+            <a:endParaRPr lang="en-US" sz="2000" dirty="0" smtClean="0"/>
+          </a:p>
+          <a:p>
+            <a:r>
+              <a:rPr lang="en-US" sz="2000" dirty="0" smtClean="0"/>
+              <a:t>            </a:t>
+            </a:r>
+            <a:r>
+              <a:rPr lang="en-US" sz="2000" dirty="0" err="1" smtClean="0"/>
+              <a:t>Assert.IsNotNull</a:t>
+            </a:r>
+            <a:r>
+              <a:rPr lang="en-US" sz="2000" dirty="0" smtClean="0"/>
+              <a:t>(</a:t>
+            </a:r>
+            <a:r>
+              <a:rPr lang="en-US" sz="2000" dirty="0" err="1" smtClean="0"/>
+              <a:t>songlocation</a:t>
+            </a:r>
+            <a:r>
+              <a:rPr lang="en-US" sz="2000" dirty="0" smtClean="0"/>
+              <a:t>);</a:t>
+            </a:r>
+          </a:p>
+          <a:p>
+            <a:endParaRPr lang="en-US" sz="2000" dirty="0" smtClean="0"/>
+          </a:p>
+          <a:p>
+            <a:r>
+              <a:rPr lang="en-US" sz="2000" dirty="0" smtClean="0"/>
+              <a:t>            string </a:t>
+            </a:r>
+            <a:r>
+              <a:rPr lang="en-US" sz="2000" dirty="0" err="1" smtClean="0"/>
+              <a:t>shipSound</a:t>
+            </a:r>
+            <a:r>
+              <a:rPr lang="en-US" sz="2000" dirty="0" smtClean="0"/>
+              <a:t>= </a:t>
+            </a:r>
+            <a:r>
+              <a:rPr lang="en-US" sz="2000" dirty="0" smtClean="0"/>
+              <a:t>“</a:t>
+            </a:r>
+            <a:r>
+              <a:rPr lang="en-US" sz="2000" dirty="0" err="1" smtClean="0"/>
+              <a:t>ShipExplosion</a:t>
+            </a:r>
+            <a:r>
+              <a:rPr lang="en-US" sz="2000" dirty="0" smtClean="0"/>
+              <a:t>";</a:t>
+            </a:r>
+            <a:endParaRPr lang="en-US" sz="2000" dirty="0" smtClean="0"/>
+          </a:p>
+          <a:p>
+            <a:r>
+              <a:rPr lang="en-US" sz="2000" dirty="0" smtClean="0"/>
+              <a:t>            </a:t>
+            </a:r>
+            <a:r>
+              <a:rPr lang="en-US" sz="2000" dirty="0" err="1" smtClean="0"/>
+              <a:t>Assert.IsNotNull</a:t>
+            </a:r>
+            <a:r>
+              <a:rPr lang="en-US" sz="2000" dirty="0" smtClean="0"/>
+              <a:t>(</a:t>
+            </a:r>
+            <a:r>
+              <a:rPr lang="en-US" sz="2000" dirty="0" err="1" smtClean="0"/>
+              <a:t>songlocation</a:t>
+            </a:r>
+            <a:r>
+              <a:rPr lang="en-US" sz="2000" dirty="0" smtClean="0"/>
+              <a:t>);</a:t>
+            </a:r>
+          </a:p>
+          <a:p>
+            <a:endParaRPr lang="en-US" sz="2000" dirty="0" smtClean="0"/>
+          </a:p>
+          <a:p>
+            <a:r>
+              <a:rPr lang="en-US" sz="2000" dirty="0" smtClean="0"/>
+              <a:t>}</a:t>
+            </a:r>
+            <a:endParaRPr lang="en-US" sz="2000" dirty="0" smtClean="0"/>
+          </a:p>
+          <a:p>
             <a:pPr marL="0" indent="0">
               <a:buNone/>
             </a:pPr>
-            <a:endParaRPr lang="en-US" sz="2400" dirty="0"/>
+            <a:endParaRPr lang="en-US" sz="2000" dirty="0"/>
           </a:p>
         </p:txBody>
       </p:sp>
     </p:spTree>
+    <p:extLst>
+      <p:ext uri="{BB962C8B-B14F-4D97-AF65-F5344CB8AC3E}">
+        <p14:creationId xmlns:p14="http://schemas.microsoft.com/office/powerpoint/2010/main" xmlns="" val="755878279"/>
+      </p:ext>
+    </p:extLst>
   </p:cSld>
   <p:clrMapOvr>
     <a:masterClrMapping/>
@@ -3841,7 +4397,12 @@
             <p:ph idx="1"/>
           </p:nvPr>
         </p:nvSpPr>
-        <p:spPr/>
+        <p:spPr>
+          <a:xfrm>
+            <a:off x="457200" y="1066800"/>
+            <a:ext cx="8229600" cy="4525963"/>
+          </a:xfrm>
+        </p:spPr>
         <p:txBody>
           <a:bodyPr/>
           <a:lstStyle/>
@@ -3878,7 +4439,17 @@
           <a:p>
             <a:r>
               <a:rPr lang="en-US" dirty="0" smtClean="0"/>
-              <a:t>Upon death player is returned to main menu</a:t>
+              <a:t>Upon death player is returned to main </a:t>
+            </a:r>
+            <a:r>
+              <a:rPr lang="en-US" dirty="0" smtClean="0"/>
+              <a:t>menu</a:t>
+            </a:r>
+          </a:p>
+          <a:p>
+            <a:r>
+              <a:rPr lang="en-US" dirty="0" smtClean="0"/>
+              <a:t>Starting a new game works but enemies spawn where the player died.</a:t>
             </a:r>
             <a:endParaRPr lang="en-US" dirty="0"/>
           </a:p>
@@ -4255,10 +4826,218 @@
             <p:ph idx="1"/>
           </p:nvPr>
         </p:nvSpPr>
-        <p:spPr/>
+        <p:spPr>
+          <a:xfrm>
+            <a:off x="457200" y="1066800"/>
+            <a:ext cx="8229600" cy="4525963"/>
+          </a:xfrm>
+        </p:spPr>
         <p:txBody>
           <a:bodyPr/>
           <a:lstStyle/>
+          <a:p>
+            <a:r>
+              <a:rPr lang="en-US" sz="2000" dirty="0" smtClean="0"/>
+              <a:t> [</a:t>
+            </a:r>
+            <a:r>
+              <a:rPr lang="en-US" sz="2000" dirty="0" err="1" smtClean="0"/>
+              <a:t>TestClass</a:t>
+            </a:r>
+            <a:r>
+              <a:rPr lang="en-US" sz="2000" dirty="0" smtClean="0"/>
+              <a:t>]</a:t>
+            </a:r>
+          </a:p>
+          <a:p>
+            <a:r>
+              <a:rPr lang="en-US" sz="2000" dirty="0" smtClean="0"/>
+              <a:t>    public class Enemy1_Test</a:t>
+            </a:r>
+          </a:p>
+          <a:p>
+            <a:r>
+              <a:rPr lang="en-US" sz="2000" dirty="0" smtClean="0"/>
+              <a:t>    {</a:t>
+            </a:r>
+          </a:p>
+          <a:p>
+            <a:r>
+              <a:rPr lang="en-US" sz="2000" dirty="0" smtClean="0"/>
+              <a:t>        Enemy1 target;</a:t>
+            </a:r>
+          </a:p>
+          <a:p>
+            <a:r>
+              <a:rPr lang="en-US" sz="2000" dirty="0" smtClean="0"/>
+              <a:t>        </a:t>
+            </a:r>
+            <a:r>
+              <a:rPr lang="en-US" sz="2000" dirty="0" err="1" smtClean="0"/>
+              <a:t>GameTime</a:t>
+            </a:r>
+            <a:r>
+              <a:rPr lang="en-US" sz="2000" dirty="0" smtClean="0"/>
+              <a:t> </a:t>
+            </a:r>
+            <a:r>
+              <a:rPr lang="en-US" sz="2000" dirty="0" err="1" smtClean="0"/>
+              <a:t>gameTime</a:t>
+            </a:r>
+            <a:r>
+              <a:rPr lang="en-US" sz="2000" dirty="0" smtClean="0"/>
+              <a:t>;</a:t>
+            </a:r>
+          </a:p>
+          <a:p>
+            <a:pPr>
+              <a:buNone/>
+            </a:pPr>
+            <a:r>
+              <a:rPr lang="en-US" sz="2000" dirty="0" smtClean="0"/>
+              <a:t>	</a:t>
+            </a:r>
+            <a:r>
+              <a:rPr lang="en-US" sz="2000" dirty="0" smtClean="0"/>
+              <a:t>	public </a:t>
+            </a:r>
+            <a:r>
+              <a:rPr lang="en-US" sz="2000" dirty="0" smtClean="0"/>
+              <a:t>void Enemy1ConstructorTest()</a:t>
+            </a:r>
+          </a:p>
+          <a:p>
+            <a:r>
+              <a:rPr lang="en-US" sz="2000" dirty="0" smtClean="0"/>
+              <a:t>        {</a:t>
+            </a:r>
+          </a:p>
+          <a:p>
+            <a:r>
+              <a:rPr lang="en-US" sz="2000" dirty="0" smtClean="0"/>
+              <a:t>            </a:t>
+            </a:r>
+            <a:r>
+              <a:rPr lang="en-US" sz="2000" dirty="0" err="1" smtClean="0"/>
+              <a:t>gameTime</a:t>
+            </a:r>
+            <a:r>
+              <a:rPr lang="en-US" sz="2000" dirty="0" smtClean="0"/>
+              <a:t> = </a:t>
+            </a:r>
+            <a:r>
+              <a:rPr lang="en-US" sz="2000" dirty="0" err="1" smtClean="0"/>
+              <a:t>MockRepository.GenerateStub</a:t>
+            </a:r>
+            <a:r>
+              <a:rPr lang="en-US" sz="2000" dirty="0" smtClean="0"/>
+              <a:t>&lt;</a:t>
+            </a:r>
+            <a:r>
+              <a:rPr lang="en-US" sz="2000" dirty="0" err="1" smtClean="0"/>
+              <a:t>GameTime</a:t>
+            </a:r>
+            <a:r>
+              <a:rPr lang="en-US" sz="2000" dirty="0" smtClean="0"/>
+              <a:t>&gt;();</a:t>
+            </a:r>
+          </a:p>
+          <a:p>
+            <a:r>
+              <a:rPr lang="en-US" sz="2000" dirty="0" smtClean="0"/>
+              <a:t>            Texture2D texture = null;</a:t>
+            </a:r>
+          </a:p>
+          <a:p>
+            <a:r>
+              <a:rPr lang="en-US" sz="2000" dirty="0" smtClean="0"/>
+              <a:t>            </a:t>
+            </a:r>
+            <a:r>
+              <a:rPr lang="en-US" sz="2000" dirty="0" err="1" smtClean="0"/>
+              <a:t>int</a:t>
+            </a:r>
+            <a:r>
+              <a:rPr lang="en-US" sz="2000" dirty="0" smtClean="0"/>
+              <a:t> X = 0;</a:t>
+            </a:r>
+          </a:p>
+          <a:p>
+            <a:r>
+              <a:rPr lang="en-US" sz="2000" dirty="0" smtClean="0"/>
+              <a:t>            </a:t>
+            </a:r>
+            <a:r>
+              <a:rPr lang="en-US" sz="2000" dirty="0" err="1" smtClean="0"/>
+              <a:t>int</a:t>
+            </a:r>
+            <a:r>
+              <a:rPr lang="en-US" sz="2000" dirty="0" smtClean="0"/>
+              <a:t> Y = 0;</a:t>
+            </a:r>
+          </a:p>
+          <a:p>
+            <a:r>
+              <a:rPr lang="en-US" sz="2000" dirty="0" smtClean="0"/>
+              <a:t>            </a:t>
+            </a:r>
+            <a:r>
+              <a:rPr lang="en-US" sz="2000" dirty="0" err="1" smtClean="0"/>
+              <a:t>int</a:t>
+            </a:r>
+            <a:r>
+              <a:rPr lang="en-US" sz="2000" dirty="0" smtClean="0"/>
+              <a:t> W = 45;</a:t>
+            </a:r>
+          </a:p>
+          <a:p>
+            <a:r>
+              <a:rPr lang="en-US" sz="2000" dirty="0" smtClean="0"/>
+              <a:t>            </a:t>
+            </a:r>
+            <a:r>
+              <a:rPr lang="en-US" sz="2000" dirty="0" err="1" smtClean="0"/>
+              <a:t>int</a:t>
+            </a:r>
+            <a:r>
+              <a:rPr lang="en-US" sz="2000" dirty="0" smtClean="0"/>
+              <a:t> H = 73;</a:t>
+            </a:r>
+          </a:p>
+          <a:p>
+            <a:r>
+              <a:rPr lang="en-US" sz="2000" dirty="0" smtClean="0"/>
+              <a:t>            </a:t>
+            </a:r>
+            <a:r>
+              <a:rPr lang="en-US" sz="2000" dirty="0" err="1" smtClean="0"/>
+              <a:t>int</a:t>
+            </a:r>
+            <a:r>
+              <a:rPr lang="en-US" sz="2000" dirty="0" smtClean="0"/>
+              <a:t> Frames = 1;</a:t>
+            </a:r>
+          </a:p>
+          <a:p>
+            <a:r>
+              <a:rPr lang="en-US" sz="2000" dirty="0" smtClean="0"/>
+              <a:t>            target = new Enemy1(texture, X, Y, W, H, Frames);</a:t>
+            </a:r>
+          </a:p>
+          <a:p>
+            <a:pPr lvl="1">
+              <a:buNone/>
+            </a:pPr>
+            <a:r>
+              <a:rPr lang="en-US" sz="1600" dirty="0" smtClean="0"/>
+              <a:t>	</a:t>
+            </a:r>
+            <a:r>
+              <a:rPr lang="en-US" sz="1600" dirty="0" smtClean="0"/>
+              <a:t>}</a:t>
+            </a:r>
+            <a:endParaRPr lang="en-US" sz="1600" dirty="0" smtClean="0"/>
+          </a:p>
           <a:p>
             <a:endParaRPr lang="en-US" sz="2000" dirty="0" smtClean="0"/>
           </a:p>
@@ -4267,7 +5046,7 @@
     </p:spTree>
     <p:extLst>
       <p:ext uri="{BB962C8B-B14F-4D97-AF65-F5344CB8AC3E}">
-        <p14:creationId xmlns:p14="http://schemas.microsoft.com/office/powerpoint/2010/main" val="2964279014"/>
+        <p14:creationId xmlns:p14="http://schemas.microsoft.com/office/powerpoint/2010/main" xmlns="" val="2964279014"/>
       </p:ext>
     </p:extLst>
   </p:cSld>
@@ -4321,14 +5100,200 @@
           <a:bodyPr/>
           <a:lstStyle/>
           <a:p>
-            <a:endParaRPr lang="en-US" sz="2000" dirty="0" smtClean="0"/>
+            <a:r>
+              <a:rPr lang="en-US" sz="1800" dirty="0" smtClean="0"/>
+              <a:t> [</a:t>
+            </a:r>
+            <a:r>
+              <a:rPr lang="en-US" sz="1800" dirty="0" err="1" smtClean="0"/>
+              <a:t>TestMethod</a:t>
+            </a:r>
+            <a:r>
+              <a:rPr lang="en-US" sz="1800" dirty="0" smtClean="0"/>
+              <a:t>()]</a:t>
+            </a:r>
+          </a:p>
+          <a:p>
+            <a:r>
+              <a:rPr lang="en-US" sz="1800" dirty="0" smtClean="0"/>
+              <a:t>        public void </a:t>
+            </a:r>
+            <a:r>
+              <a:rPr lang="en-US" sz="1800" dirty="0" err="1" smtClean="0"/>
+              <a:t>DeactivateTest</a:t>
+            </a:r>
+            <a:r>
+              <a:rPr lang="en-US" sz="1800" dirty="0" smtClean="0"/>
+              <a:t>()</a:t>
+            </a:r>
+          </a:p>
+          <a:p>
+            <a:r>
+              <a:rPr lang="en-US" sz="1800" dirty="0" smtClean="0"/>
+              <a:t>        {</a:t>
+            </a:r>
+          </a:p>
+          <a:p>
+            <a:r>
+              <a:rPr lang="en-US" sz="1800" dirty="0" smtClean="0"/>
+              <a:t>            </a:t>
+            </a:r>
+            <a:r>
+              <a:rPr lang="en-US" sz="1800" dirty="0" err="1" smtClean="0"/>
+              <a:t>bool</a:t>
+            </a:r>
+            <a:r>
+              <a:rPr lang="en-US" sz="1800" dirty="0" smtClean="0"/>
+              <a:t> status = </a:t>
+            </a:r>
+            <a:r>
+              <a:rPr lang="en-US" sz="1800" dirty="0" err="1" smtClean="0"/>
+              <a:t>target.IsActive</a:t>
+            </a:r>
+            <a:r>
+              <a:rPr lang="en-US" sz="1800" dirty="0" smtClean="0"/>
+              <a:t>;</a:t>
+            </a:r>
+          </a:p>
+          <a:p>
+            <a:r>
+              <a:rPr lang="en-US" sz="1800" dirty="0" smtClean="0"/>
+              <a:t>            </a:t>
+            </a:r>
+            <a:r>
+              <a:rPr lang="en-US" sz="1800" dirty="0" err="1" smtClean="0"/>
+              <a:t>bool</a:t>
+            </a:r>
+            <a:r>
+              <a:rPr lang="en-US" sz="1800" dirty="0" smtClean="0"/>
+              <a:t> active = true;</a:t>
+            </a:r>
+          </a:p>
+          <a:p>
+            <a:r>
+              <a:rPr lang="en-US" sz="1800" dirty="0" smtClean="0"/>
+              <a:t>            </a:t>
+            </a:r>
+            <a:r>
+              <a:rPr lang="en-US" sz="1800" dirty="0" err="1" smtClean="0"/>
+              <a:t>target.Deactivate</a:t>
+            </a:r>
+            <a:r>
+              <a:rPr lang="en-US" sz="1800" dirty="0" smtClean="0"/>
+              <a:t>();</a:t>
+            </a:r>
+          </a:p>
+          <a:p>
+            <a:r>
+              <a:rPr lang="en-US" sz="1800" dirty="0" smtClean="0"/>
+              <a:t>            </a:t>
+            </a:r>
+            <a:r>
+              <a:rPr lang="en-US" sz="1800" dirty="0" err="1" smtClean="0"/>
+              <a:t>Assert.AreEqual</a:t>
+            </a:r>
+            <a:r>
+              <a:rPr lang="en-US" sz="1800" dirty="0" smtClean="0"/>
+              <a:t>(active, status);</a:t>
+            </a:r>
+          </a:p>
+          <a:p>
+            <a:r>
+              <a:rPr lang="en-US" sz="1800" dirty="0" smtClean="0"/>
+              <a:t>        </a:t>
+            </a:r>
+            <a:r>
+              <a:rPr lang="en-US" sz="1800" dirty="0" smtClean="0"/>
+              <a:t>}</a:t>
+            </a:r>
+            <a:endParaRPr lang="en-US" sz="1800" dirty="0" smtClean="0"/>
+          </a:p>
+          <a:p>
+            <a:endParaRPr lang="en-US" sz="1800" dirty="0" smtClean="0"/>
+          </a:p>
+          <a:p>
+            <a:r>
+              <a:rPr lang="en-US" sz="1800" dirty="0" smtClean="0"/>
+              <a:t>        </a:t>
+            </a:r>
+            <a:r>
+              <a:rPr lang="en-US" sz="1800" dirty="0" smtClean="0"/>
+              <a:t>[</a:t>
+            </a:r>
+            <a:r>
+              <a:rPr lang="en-US" sz="1800" dirty="0" err="1" smtClean="0"/>
+              <a:t>TestMethod</a:t>
+            </a:r>
+            <a:r>
+              <a:rPr lang="en-US" sz="1800" dirty="0" smtClean="0"/>
+              <a:t>()]</a:t>
+            </a:r>
+          </a:p>
+          <a:p>
+            <a:r>
+              <a:rPr lang="en-US" sz="1800" dirty="0" smtClean="0"/>
+              <a:t>        public void </a:t>
+            </a:r>
+            <a:r>
+              <a:rPr lang="en-US" sz="1800" dirty="0" err="1" smtClean="0"/>
+              <a:t>MovementTest</a:t>
+            </a:r>
+            <a:r>
+              <a:rPr lang="en-US" sz="1800" dirty="0" smtClean="0"/>
+              <a:t>()</a:t>
+            </a:r>
+          </a:p>
+          <a:p>
+            <a:r>
+              <a:rPr lang="en-US" sz="1800" dirty="0" smtClean="0"/>
+              <a:t>        {</a:t>
+            </a:r>
+          </a:p>
+          <a:p>
+            <a:r>
+              <a:rPr lang="en-US" sz="1800" dirty="0" smtClean="0"/>
+              <a:t>            </a:t>
+            </a:r>
+            <a:r>
+              <a:rPr lang="en-US" sz="1800" dirty="0" err="1" smtClean="0"/>
+              <a:t>target.Movement</a:t>
+            </a:r>
+            <a:r>
+              <a:rPr lang="en-US" sz="1800" dirty="0" smtClean="0"/>
+              <a:t>();</a:t>
+            </a:r>
+          </a:p>
+          <a:p>
+            <a:r>
+              <a:rPr lang="en-US" sz="1800" dirty="0" smtClean="0"/>
+              <a:t>            </a:t>
+            </a:r>
+            <a:r>
+              <a:rPr lang="en-US" sz="1800" dirty="0" err="1" smtClean="0"/>
+              <a:t>Assert.Inconclusive</a:t>
+            </a:r>
+            <a:r>
+              <a:rPr lang="en-US" sz="1800" dirty="0" smtClean="0"/>
+              <a:t>("A method that does not return a value cannot be verified.");</a:t>
+            </a:r>
+          </a:p>
+          <a:p>
+            <a:r>
+              <a:rPr lang="en-US" sz="1800" dirty="0" smtClean="0"/>
+              <a:t>        </a:t>
+            </a:r>
+            <a:r>
+              <a:rPr lang="en-US" sz="1800" dirty="0" smtClean="0"/>
+              <a:t>}</a:t>
+            </a:r>
+            <a:endParaRPr lang="en-US" sz="1800" dirty="0" smtClean="0"/>
           </a:p>
         </p:txBody>
       </p:sp>
     </p:spTree>
     <p:extLst>
       <p:ext uri="{BB962C8B-B14F-4D97-AF65-F5344CB8AC3E}">
-        <p14:creationId xmlns:p14="http://schemas.microsoft.com/office/powerpoint/2010/main" val="1661936536"/>
+        <p14:creationId xmlns:p14="http://schemas.microsoft.com/office/powerpoint/2010/main" xmlns="" val="1661936536"/>
       </p:ext>
     </p:extLst>
   </p:cSld>
@@ -4364,43 +5329,359 @@
       </p:grpSpPr>
       <p:sp>
         <p:nvSpPr>
-          <p:cNvPr id="2" name="Title 1"/>
-          <p:cNvSpPr>
-            <a:spLocks noGrp="1"/>
-          </p:cNvSpPr>
-          <p:nvPr>
-            <p:ph type="title"/>
-          </p:nvPr>
-        </p:nvSpPr>
-        <p:spPr/>
+          <p:cNvPr id="3" name="Content Placeholder 2"/>
+          <p:cNvSpPr>
+            <a:spLocks noGrp="1"/>
+          </p:cNvSpPr>
+          <p:nvPr>
+            <p:ph idx="1"/>
+          </p:nvPr>
+        </p:nvSpPr>
+        <p:spPr>
+          <a:xfrm>
+            <a:off x="457200" y="304800"/>
+            <a:ext cx="8229600" cy="4525963"/>
+          </a:xfrm>
+        </p:spPr>
         <p:txBody>
           <a:bodyPr/>
           <a:lstStyle/>
           <a:p>
-            <a:r>
-              <a:rPr lang="en-US" dirty="0" smtClean="0"/>
-              <a:t>Collisions Test Code</a:t>
-            </a:r>
-            <a:endParaRPr lang="en-US" dirty="0"/>
-          </a:p>
-        </p:txBody>
-      </p:sp>
-      <p:sp>
-        <p:nvSpPr>
-          <p:cNvPr id="3" name="Content Placeholder 2"/>
-          <p:cNvSpPr>
-            <a:spLocks noGrp="1"/>
-          </p:cNvSpPr>
-          <p:nvPr>
-            <p:ph idx="1"/>
-          </p:nvPr>
-        </p:nvSpPr>
-        <p:spPr/>
-        <p:txBody>
-          <a:bodyPr/>
-          <a:lstStyle/>
-          <a:p>
-            <a:endParaRPr lang="en-US" dirty="0"/>
+            <a:pPr>
+              <a:buNone/>
+            </a:pPr>
+            <a:r>
+              <a:rPr lang="en-US" sz="1800" dirty="0" smtClean="0"/>
+              <a:t> [</a:t>
+            </a:r>
+            <a:r>
+              <a:rPr lang="en-US" sz="1800" dirty="0" err="1" smtClean="0"/>
+              <a:t>TestMethod</a:t>
+            </a:r>
+            <a:r>
+              <a:rPr lang="en-US" sz="1800" dirty="0" smtClean="0"/>
+              <a:t>()]</a:t>
+            </a:r>
+          </a:p>
+          <a:p>
+            <a:r>
+              <a:rPr lang="en-US" sz="1800" dirty="0" smtClean="0"/>
+              <a:t>        public void </a:t>
+            </a:r>
+            <a:r>
+              <a:rPr lang="en-US" sz="1800" dirty="0" err="1" smtClean="0"/>
+              <a:t>GenerateTest</a:t>
+            </a:r>
+            <a:r>
+              <a:rPr lang="en-US" sz="1800" dirty="0" smtClean="0"/>
+              <a:t>()</a:t>
+            </a:r>
+          </a:p>
+          <a:p>
+            <a:r>
+              <a:rPr lang="en-US" sz="1800" dirty="0" smtClean="0"/>
+              <a:t>        {</a:t>
+            </a:r>
+          </a:p>
+          <a:p>
+            <a:r>
+              <a:rPr lang="en-US" sz="1800" dirty="0" smtClean="0"/>
+              <a:t>            </a:t>
+            </a:r>
+            <a:r>
+              <a:rPr lang="en-US" sz="1800" dirty="0" err="1" smtClean="0"/>
+              <a:t>int</a:t>
+            </a:r>
+            <a:r>
+              <a:rPr lang="en-US" sz="1800" dirty="0" smtClean="0"/>
+              <a:t> </a:t>
+            </a:r>
+            <a:r>
+              <a:rPr lang="en-US" sz="1800" dirty="0" err="1" smtClean="0"/>
+              <a:t>shipNumber</a:t>
+            </a:r>
+            <a:r>
+              <a:rPr lang="en-US" sz="1800" dirty="0" smtClean="0"/>
+              <a:t> = 1;</a:t>
+            </a:r>
+          </a:p>
+          <a:p>
+            <a:r>
+              <a:rPr lang="en-US" sz="1800" dirty="0" smtClean="0"/>
+              <a:t>            </a:t>
+            </a:r>
+            <a:r>
+              <a:rPr lang="en-US" sz="1800" dirty="0" err="1" smtClean="0"/>
+              <a:t>int</a:t>
+            </a:r>
+            <a:r>
+              <a:rPr lang="en-US" sz="1800" dirty="0" smtClean="0"/>
+              <a:t> </a:t>
+            </a:r>
+            <a:r>
+              <a:rPr lang="en-US" sz="1800" dirty="0" err="1" smtClean="0"/>
+              <a:t>expectedY</a:t>
+            </a:r>
+            <a:r>
+              <a:rPr lang="en-US" sz="1800" dirty="0" smtClean="0"/>
+              <a:t> = 100;</a:t>
+            </a:r>
+          </a:p>
+          <a:p>
+            <a:r>
+              <a:rPr lang="en-US" sz="1800" dirty="0" smtClean="0"/>
+              <a:t>            </a:t>
+            </a:r>
+            <a:r>
+              <a:rPr lang="en-US" sz="1800" dirty="0" err="1" smtClean="0"/>
+              <a:t>bool</a:t>
+            </a:r>
+            <a:r>
+              <a:rPr lang="en-US" sz="1800" dirty="0" smtClean="0"/>
+              <a:t> </a:t>
+            </a:r>
+            <a:r>
+              <a:rPr lang="en-US" sz="1800" dirty="0" err="1" smtClean="0"/>
+              <a:t>expectedActive</a:t>
+            </a:r>
+            <a:r>
+              <a:rPr lang="en-US" sz="1800" dirty="0" smtClean="0"/>
+              <a:t> = true;</a:t>
+            </a:r>
+          </a:p>
+          <a:p>
+            <a:r>
+              <a:rPr lang="en-US" sz="1800" dirty="0" smtClean="0"/>
+              <a:t>            </a:t>
+            </a:r>
+            <a:r>
+              <a:rPr lang="en-US" sz="1800" dirty="0" err="1" smtClean="0"/>
+              <a:t>target.Generate</a:t>
+            </a:r>
+            <a:r>
+              <a:rPr lang="en-US" sz="1800" dirty="0" smtClean="0"/>
+              <a:t>(</a:t>
+            </a:r>
+            <a:r>
+              <a:rPr lang="en-US" sz="1800" dirty="0" err="1" smtClean="0"/>
+              <a:t>shipNumber</a:t>
+            </a:r>
+            <a:r>
+              <a:rPr lang="en-US" sz="1800" dirty="0" smtClean="0"/>
+              <a:t>);</a:t>
+            </a:r>
+          </a:p>
+          <a:p>
+            <a:r>
+              <a:rPr lang="en-US" sz="1800" dirty="0" smtClean="0"/>
+              <a:t>            </a:t>
+            </a:r>
+            <a:r>
+              <a:rPr lang="en-US" sz="1800" dirty="0" err="1" smtClean="0"/>
+              <a:t>bool</a:t>
+            </a:r>
+            <a:r>
+              <a:rPr lang="en-US" sz="1800" dirty="0" smtClean="0"/>
+              <a:t> </a:t>
+            </a:r>
+            <a:r>
+              <a:rPr lang="en-US" sz="1800" dirty="0" err="1" smtClean="0"/>
+              <a:t>actualActive</a:t>
+            </a:r>
+            <a:r>
+              <a:rPr lang="en-US" sz="1800" dirty="0" smtClean="0"/>
+              <a:t> = </a:t>
+            </a:r>
+            <a:r>
+              <a:rPr lang="en-US" sz="1800" dirty="0" err="1" smtClean="0"/>
+              <a:t>target.IsActive</a:t>
+            </a:r>
+            <a:r>
+              <a:rPr lang="en-US" sz="1800" dirty="0" smtClean="0"/>
+              <a:t>;</a:t>
+            </a:r>
+          </a:p>
+          <a:p>
+            <a:r>
+              <a:rPr lang="en-US" sz="1800" dirty="0" smtClean="0"/>
+              <a:t>            </a:t>
+            </a:r>
+            <a:r>
+              <a:rPr lang="en-US" sz="1800" dirty="0" err="1" smtClean="0"/>
+              <a:t>int</a:t>
+            </a:r>
+            <a:r>
+              <a:rPr lang="en-US" sz="1800" dirty="0" smtClean="0"/>
+              <a:t> </a:t>
+            </a:r>
+            <a:r>
+              <a:rPr lang="en-US" sz="1800" dirty="0" err="1" smtClean="0"/>
+              <a:t>calculatedY</a:t>
+            </a:r>
+            <a:r>
+              <a:rPr lang="en-US" sz="1800" dirty="0" smtClean="0"/>
+              <a:t> = </a:t>
+            </a:r>
+            <a:r>
+              <a:rPr lang="en-US" sz="1800" dirty="0" err="1" smtClean="0"/>
+              <a:t>target.Y</a:t>
+            </a:r>
+            <a:r>
+              <a:rPr lang="en-US" sz="1800" dirty="0" smtClean="0"/>
+              <a:t>;</a:t>
+            </a:r>
+          </a:p>
+          <a:p>
+            <a:r>
+              <a:rPr lang="en-US" sz="1800" dirty="0" smtClean="0"/>
+              <a:t>            </a:t>
+            </a:r>
+            <a:r>
+              <a:rPr lang="en-US" sz="1800" dirty="0" err="1" smtClean="0"/>
+              <a:t>int</a:t>
+            </a:r>
+            <a:r>
+              <a:rPr lang="en-US" sz="1800" dirty="0" smtClean="0"/>
+              <a:t> </a:t>
+            </a:r>
+            <a:r>
+              <a:rPr lang="en-US" sz="1800" dirty="0" err="1" smtClean="0"/>
+              <a:t>expectedX</a:t>
+            </a:r>
+            <a:r>
+              <a:rPr lang="en-US" sz="1800" dirty="0" smtClean="0"/>
+              <a:t> = 750;</a:t>
+            </a:r>
+          </a:p>
+          <a:p>
+            <a:r>
+              <a:rPr lang="en-US" sz="1800" dirty="0" smtClean="0"/>
+              <a:t>            </a:t>
+            </a:r>
+            <a:r>
+              <a:rPr lang="en-US" sz="1800" dirty="0" err="1" smtClean="0"/>
+              <a:t>int</a:t>
+            </a:r>
+            <a:r>
+              <a:rPr lang="en-US" sz="1800" dirty="0" smtClean="0"/>
+              <a:t> </a:t>
+            </a:r>
+            <a:r>
+              <a:rPr lang="en-US" sz="1800" dirty="0" err="1" smtClean="0"/>
+              <a:t>calculatedX</a:t>
+            </a:r>
+            <a:r>
+              <a:rPr lang="en-US" sz="1800" dirty="0" smtClean="0"/>
+              <a:t> = </a:t>
+            </a:r>
+            <a:r>
+              <a:rPr lang="en-US" sz="1800" dirty="0" err="1" smtClean="0"/>
+              <a:t>target.X</a:t>
+            </a:r>
+            <a:r>
+              <a:rPr lang="en-US" sz="1800" dirty="0" smtClean="0"/>
+              <a:t>;</a:t>
+            </a:r>
+          </a:p>
+          <a:p>
+            <a:endParaRPr lang="en-US" sz="1800" dirty="0" smtClean="0"/>
+          </a:p>
+          <a:p>
+            <a:r>
+              <a:rPr lang="en-US" sz="1800" dirty="0" smtClean="0"/>
+              <a:t>            </a:t>
+            </a:r>
+            <a:r>
+              <a:rPr lang="en-US" sz="1800" dirty="0" err="1" smtClean="0"/>
+              <a:t>Assert.AreEqual</a:t>
+            </a:r>
+            <a:r>
+              <a:rPr lang="en-US" sz="1800" dirty="0" smtClean="0"/>
+              <a:t>(</a:t>
+            </a:r>
+            <a:r>
+              <a:rPr lang="en-US" sz="1800" dirty="0" err="1" smtClean="0"/>
+              <a:t>expectedX</a:t>
+            </a:r>
+            <a:r>
+              <a:rPr lang="en-US" sz="1800" dirty="0" smtClean="0"/>
+              <a:t>, </a:t>
+            </a:r>
+            <a:r>
+              <a:rPr lang="en-US" sz="1800" dirty="0" err="1" smtClean="0"/>
+              <a:t>calculatedX</a:t>
+            </a:r>
+            <a:r>
+              <a:rPr lang="en-US" sz="1800" dirty="0" smtClean="0"/>
+              <a:t>);</a:t>
+            </a:r>
+          </a:p>
+          <a:p>
+            <a:r>
+              <a:rPr lang="en-US" sz="1800" dirty="0" smtClean="0"/>
+              <a:t>            </a:t>
+            </a:r>
+            <a:r>
+              <a:rPr lang="en-US" sz="1800" dirty="0" err="1" smtClean="0"/>
+              <a:t>Assert.AreEqual</a:t>
+            </a:r>
+            <a:r>
+              <a:rPr lang="en-US" sz="1800" dirty="0" smtClean="0"/>
+              <a:t>(</a:t>
+            </a:r>
+            <a:r>
+              <a:rPr lang="en-US" sz="1800" dirty="0" err="1" smtClean="0"/>
+              <a:t>expectedActive</a:t>
+            </a:r>
+            <a:r>
+              <a:rPr lang="en-US" sz="1800" dirty="0" smtClean="0"/>
+              <a:t>, </a:t>
+            </a:r>
+            <a:r>
+              <a:rPr lang="en-US" sz="1800" dirty="0" err="1" smtClean="0"/>
+              <a:t>actualActive</a:t>
+            </a:r>
+            <a:r>
+              <a:rPr lang="en-US" sz="1800" dirty="0" smtClean="0"/>
+              <a:t>);</a:t>
+            </a:r>
+          </a:p>
+          <a:p>
+            <a:r>
+              <a:rPr lang="en-US" sz="1800" dirty="0" smtClean="0"/>
+              <a:t>            </a:t>
+            </a:r>
+            <a:r>
+              <a:rPr lang="en-US" sz="1800" dirty="0" err="1" smtClean="0"/>
+              <a:t>Assert.AreEqual</a:t>
+            </a:r>
+            <a:r>
+              <a:rPr lang="en-US" sz="1800" dirty="0" smtClean="0"/>
+              <a:t>(</a:t>
+            </a:r>
+            <a:r>
+              <a:rPr lang="en-US" sz="1800" dirty="0" err="1" smtClean="0"/>
+              <a:t>expectedY</a:t>
+            </a:r>
+            <a:r>
+              <a:rPr lang="en-US" sz="1800" dirty="0" smtClean="0"/>
+              <a:t>, </a:t>
+            </a:r>
+            <a:r>
+              <a:rPr lang="en-US" sz="1800" dirty="0" err="1" smtClean="0"/>
+              <a:t>calculatedY</a:t>
+            </a:r>
+            <a:r>
+              <a:rPr lang="en-US" sz="1800" dirty="0" smtClean="0"/>
+              <a:t>);</a:t>
+            </a:r>
+          </a:p>
+          <a:p>
+            <a:r>
+              <a:rPr lang="en-US" sz="1800" dirty="0" smtClean="0"/>
+              <a:t>        }</a:t>
+            </a:r>
+            <a:endParaRPr lang="en-US" sz="1800" dirty="0"/>
           </a:p>
         </p:txBody>
       </p:sp>
@@ -4409,13 +5690,6 @@
   <p:clrMapOvr>
     <a:masterClrMapping/>
   </p:clrMapOvr>
-  <p:timing>
-    <p:tnLst>
-      <p:par>
-        <p:cTn id="1" dur="indefinite" restart="never" nodeType="tmRoot"/>
-      </p:par>
-    </p:tnLst>
-  </p:timing>
 </p:sld>
 </file>
 
@@ -4438,200 +5712,246 @@
       </p:grpSpPr>
       <p:sp>
         <p:nvSpPr>
-          <p:cNvPr id="2" name="Title 1"/>
-          <p:cNvSpPr>
-            <a:spLocks noGrp="1"/>
-          </p:cNvSpPr>
-          <p:nvPr>
-            <p:ph type="title"/>
-          </p:nvPr>
-        </p:nvSpPr>
-        <p:spPr/>
+          <p:cNvPr id="3" name="Content Placeholder 2"/>
+          <p:cNvSpPr>
+            <a:spLocks noGrp="1"/>
+          </p:cNvSpPr>
+          <p:nvPr>
+            <p:ph idx="1"/>
+          </p:nvPr>
+        </p:nvSpPr>
+        <p:spPr>
+          <a:xfrm>
+            <a:off x="457200" y="0"/>
+            <a:ext cx="8229600" cy="4525963"/>
+          </a:xfrm>
+        </p:spPr>
         <p:txBody>
           <a:bodyPr/>
           <a:lstStyle/>
           <a:p>
             <a:r>
-              <a:rPr lang="en-US" dirty="0" smtClean="0"/>
-              <a:t>Lives Test Code</a:t>
-            </a:r>
-            <a:endParaRPr lang="en-US" dirty="0"/>
-          </a:p>
-        </p:txBody>
-      </p:sp>
-      <p:sp>
-        <p:nvSpPr>
-          <p:cNvPr id="3" name="Content Placeholder 2"/>
-          <p:cNvSpPr>
-            <a:spLocks noGrp="1"/>
-          </p:cNvSpPr>
-          <p:nvPr>
-            <p:ph idx="1"/>
-          </p:nvPr>
-        </p:nvSpPr>
-        <p:spPr/>
-        <p:txBody>
-          <a:bodyPr/>
-          <a:lstStyle/>
-          <a:p>
-            <a:pPr marL="0" indent="0">
-              <a:buNone/>
-            </a:pPr>
-            <a:r>
-              <a:rPr lang="en-US" sz="2400" dirty="0"/>
+              <a:rPr lang="en-US" sz="2000" dirty="0" smtClean="0"/>
+              <a:t>        </a:t>
+            </a:r>
+            <a:r>
+              <a:rPr lang="en-US" sz="2000" dirty="0" smtClean="0"/>
+              <a:t>[</a:t>
+            </a:r>
+            <a:r>
+              <a:rPr lang="en-US" sz="2000" dirty="0" err="1" smtClean="0"/>
+              <a:t>TestMethod</a:t>
+            </a:r>
+            <a:r>
+              <a:rPr lang="en-US" sz="2000" dirty="0" smtClean="0"/>
+              <a:t>()]</a:t>
+            </a:r>
+          </a:p>
+          <a:p>
+            <a:r>
+              <a:rPr lang="en-US" sz="2000" dirty="0" smtClean="0"/>
+              <a:t>        public void </a:t>
+            </a:r>
+            <a:r>
+              <a:rPr lang="en-US" sz="2000" dirty="0" err="1" smtClean="0"/>
+              <a:t>IsActiveTest</a:t>
+            </a:r>
+            <a:r>
+              <a:rPr lang="en-US" sz="2000" dirty="0" smtClean="0"/>
+              <a:t>()</a:t>
+            </a:r>
+          </a:p>
+          <a:p>
+            <a:r>
+              <a:rPr lang="en-US" sz="2000" dirty="0" smtClean="0"/>
+              <a:t>        {</a:t>
+            </a:r>
+          </a:p>
+          <a:p>
+            <a:r>
+              <a:rPr lang="en-US" sz="2000" dirty="0" smtClean="0"/>
+              <a:t>            </a:t>
+            </a:r>
+            <a:r>
+              <a:rPr lang="en-US" sz="2000" dirty="0" err="1" smtClean="0"/>
+              <a:t>bool</a:t>
+            </a:r>
+            <a:r>
+              <a:rPr lang="en-US" sz="2000" dirty="0" smtClean="0"/>
+              <a:t> expected = true;</a:t>
+            </a:r>
+          </a:p>
+          <a:p>
+            <a:r>
+              <a:rPr lang="en-US" sz="2000" dirty="0" smtClean="0"/>
+              <a:t>            </a:t>
+            </a:r>
+            <a:r>
+              <a:rPr lang="en-US" sz="2000" dirty="0" err="1" smtClean="0"/>
+              <a:t>bool</a:t>
+            </a:r>
+            <a:r>
+              <a:rPr lang="en-US" sz="2000" dirty="0" smtClean="0"/>
+              <a:t> actual;</a:t>
+            </a:r>
+          </a:p>
+          <a:p>
+            <a:r>
+              <a:rPr lang="en-US" sz="2000" dirty="0" smtClean="0"/>
+              <a:t>            actual = </a:t>
+            </a:r>
+            <a:r>
+              <a:rPr lang="en-US" sz="2000" dirty="0" err="1" smtClean="0"/>
+              <a:t>target.IsActive</a:t>
+            </a:r>
+            <a:r>
+              <a:rPr lang="en-US" sz="2000" dirty="0" smtClean="0"/>
+              <a:t>;</a:t>
+            </a:r>
+          </a:p>
+          <a:p>
+            <a:r>
+              <a:rPr lang="en-US" sz="2000" dirty="0" smtClean="0"/>
+              <a:t>            </a:t>
+            </a:r>
+            <a:r>
+              <a:rPr lang="en-US" sz="2000" dirty="0" err="1" smtClean="0"/>
+              <a:t>Assert.AreEqual</a:t>
+            </a:r>
+            <a:r>
+              <a:rPr lang="en-US" sz="2000" dirty="0" smtClean="0"/>
+              <a:t>(expected, actual);</a:t>
+            </a:r>
+          </a:p>
+          <a:p>
+            <a:r>
+              <a:rPr lang="en-US" sz="2000" dirty="0" smtClean="0"/>
+              <a:t>        }</a:t>
+            </a:r>
+          </a:p>
+          <a:p>
+            <a:endParaRPr lang="en-US" sz="2000" dirty="0" smtClean="0"/>
+          </a:p>
+          <a:p>
+            <a:r>
+              <a:rPr lang="en-US" sz="2000" dirty="0" smtClean="0"/>
+              <a:t>        </a:t>
+            </a:r>
+            <a:r>
+              <a:rPr lang="en-US" sz="2000" dirty="0" smtClean="0"/>
+              <a:t>[</a:t>
+            </a:r>
+            <a:r>
+              <a:rPr lang="en-US" sz="2000" dirty="0" err="1" smtClean="0"/>
+              <a:t>TestMethod</a:t>
+            </a:r>
+            <a:r>
+              <a:rPr lang="en-US" sz="2000" dirty="0" smtClean="0"/>
+              <a:t>()]</a:t>
+            </a:r>
+          </a:p>
+          <a:p>
+            <a:r>
+              <a:rPr lang="en-US" sz="2000" dirty="0" smtClean="0"/>
+              <a:t>        public void </a:t>
+            </a:r>
+            <a:r>
+              <a:rPr lang="en-US" sz="2000" dirty="0" err="1" smtClean="0"/>
+              <a:t>OffsetTest</a:t>
+            </a:r>
+            <a:r>
+              <a:rPr lang="en-US" sz="2000" dirty="0" smtClean="0"/>
+              <a:t>()</a:t>
+            </a:r>
+          </a:p>
+          <a:p>
+            <a:r>
+              <a:rPr lang="en-US" sz="2000" dirty="0" smtClean="0"/>
+              <a:t>        {</a:t>
+            </a:r>
+          </a:p>
+          <a:p>
+            <a:r>
+              <a:rPr lang="en-US" sz="2000" dirty="0" smtClean="0"/>
+              <a:t>            </a:t>
+            </a:r>
+            <a:r>
+              <a:rPr lang="en-US" sz="2000" dirty="0" err="1" smtClean="0"/>
+              <a:t>int</a:t>
+            </a:r>
+            <a:r>
+              <a:rPr lang="en-US" sz="2000" dirty="0" smtClean="0"/>
               <a:t> </a:t>
             </a:r>
-            <a:endParaRPr lang="en-US" sz="2400" dirty="0" smtClean="0"/>
-          </a:p>
-          <a:p>
-            <a:pPr marL="0" indent="0">
-              <a:buNone/>
-            </a:pPr>
-            <a:r>
-              <a:rPr lang="en-US" sz="2400" dirty="0" err="1"/>
-              <a:t>HudValues</a:t>
-            </a:r>
-            <a:r>
-              <a:rPr lang="en-US" sz="2400" dirty="0"/>
-              <a:t> </a:t>
-            </a:r>
-            <a:r>
-              <a:rPr lang="en-US" sz="2400" dirty="0" err="1"/>
-              <a:t>hud</a:t>
-            </a:r>
-            <a:r>
-              <a:rPr lang="en-US" sz="2400" dirty="0"/>
-              <a:t> = new </a:t>
-            </a:r>
-            <a:r>
-              <a:rPr lang="en-US" sz="2400" dirty="0" err="1"/>
-              <a:t>HudValues</a:t>
-            </a:r>
-            <a:r>
-              <a:rPr lang="en-US" sz="2400" smtClean="0"/>
-              <a:t>();</a:t>
-            </a:r>
-          </a:p>
-          <a:p>
-            <a:pPr marL="0" indent="0">
-              <a:buNone/>
-            </a:pPr>
-            <a:endParaRPr lang="en-US" sz="2400"/>
-          </a:p>
-          <a:p>
-            <a:pPr marL="0" indent="0">
-              <a:buNone/>
-            </a:pPr>
-            <a:r>
-              <a:rPr lang="en-US" sz="2400" dirty="0" smtClean="0"/>
-              <a:t>[</a:t>
-            </a:r>
-            <a:r>
-              <a:rPr lang="en-US" sz="2400" dirty="0" err="1"/>
-              <a:t>TestMethod</a:t>
-            </a:r>
-            <a:r>
-              <a:rPr lang="en-US" sz="2400" dirty="0"/>
-              <a:t>]</a:t>
-            </a:r>
-          </a:p>
-          <a:p>
-            <a:pPr marL="0" indent="0">
-              <a:buNone/>
-            </a:pPr>
-            <a:r>
-              <a:rPr lang="en-US" sz="2400" dirty="0"/>
-              <a:t>        public void </a:t>
-            </a:r>
-            <a:r>
-              <a:rPr lang="en-US" sz="2400" dirty="0" err="1"/>
-              <a:t>LivesValue_Test</a:t>
-            </a:r>
-            <a:r>
-              <a:rPr lang="en-US" sz="2400" dirty="0"/>
-              <a:t>()</a:t>
-            </a:r>
-          </a:p>
-          <a:p>
-            <a:pPr marL="0" indent="0">
-              <a:buNone/>
-            </a:pPr>
-            <a:r>
-              <a:rPr lang="en-US" sz="2400" dirty="0"/>
-              <a:t>        {</a:t>
-            </a:r>
-          </a:p>
-          <a:p>
-            <a:pPr marL="0" indent="0">
-              <a:buNone/>
-            </a:pPr>
-            <a:r>
-              <a:rPr lang="en-US" sz="2400" dirty="0"/>
+            <a:r>
+              <a:rPr lang="en-US" sz="2000" dirty="0" err="1" smtClean="0"/>
+              <a:t>expectedOffset</a:t>
+            </a:r>
+            <a:r>
+              <a:rPr lang="en-US" sz="2000" dirty="0" smtClean="0"/>
+              <a:t> = 50;</a:t>
+            </a:r>
+          </a:p>
+          <a:p>
+            <a:r>
+              <a:rPr lang="en-US" sz="2000" dirty="0" smtClean="0"/>
               <a:t>            </a:t>
             </a:r>
             <a:r>
-              <a:rPr lang="en-US" sz="2400" dirty="0" err="1"/>
-              <a:t>hud.lives</a:t>
-            </a:r>
-            <a:r>
-              <a:rPr lang="en-US" sz="2400" dirty="0"/>
-              <a:t> = 3;</a:t>
-            </a:r>
-          </a:p>
-          <a:p>
-            <a:pPr marL="0" indent="0">
-              <a:buNone/>
-            </a:pPr>
-            <a:r>
-              <a:rPr lang="en-US" sz="2400" dirty="0"/>
+              <a:rPr lang="en-US" sz="2000" dirty="0" err="1" smtClean="0"/>
+              <a:t>target.Offset</a:t>
+            </a:r>
+            <a:r>
+              <a:rPr lang="en-US" sz="2000" dirty="0" smtClean="0"/>
+              <a:t> = 50;</a:t>
+            </a:r>
+          </a:p>
+          <a:p>
+            <a:r>
+              <a:rPr lang="en-US" sz="2000" dirty="0" smtClean="0"/>
               <a:t>            </a:t>
             </a:r>
             <a:r>
-              <a:rPr lang="en-US" sz="2400" dirty="0" err="1"/>
+              <a:rPr lang="en-US" sz="2000" dirty="0" err="1" smtClean="0"/>
               <a:t>Assert.AreEqual</a:t>
             </a:r>
             <a:r>
-              <a:rPr lang="en-US" sz="2400" dirty="0"/>
-              <a:t>(3, </a:t>
-            </a:r>
-            <a:r>
-              <a:rPr lang="en-US" sz="2400" dirty="0" err="1"/>
-              <a:t>hud.lives</a:t>
-            </a:r>
-            <a:r>
-              <a:rPr lang="en-US" sz="2400" dirty="0"/>
+              <a:rPr lang="en-US" sz="2000" dirty="0" smtClean="0"/>
+              <a:t>(</a:t>
+            </a:r>
+            <a:r>
+              <a:rPr lang="en-US" sz="2000" dirty="0" err="1" smtClean="0"/>
+              <a:t>expectedOffset</a:t>
+            </a:r>
+            <a:r>
+              <a:rPr lang="en-US" sz="2000" dirty="0" smtClean="0"/>
+              <a:t>, </a:t>
+            </a:r>
+            <a:r>
+              <a:rPr lang="en-US" sz="2000" dirty="0" err="1" smtClean="0"/>
+              <a:t>target.Offset</a:t>
+            </a:r>
+            <a:r>
+              <a:rPr lang="en-US" sz="2000" dirty="0" smtClean="0"/>
               <a:t>);</a:t>
             </a:r>
           </a:p>
           <a:p>
-            <a:pPr marL="0" indent="0">
-              <a:buNone/>
-            </a:pPr>
-            <a:r>
-              <a:rPr lang="en-US" sz="2400" dirty="0"/>
+            <a:r>
+              <a:rPr lang="en-US" sz="2000" dirty="0" smtClean="0"/>
               <a:t>        }</a:t>
             </a:r>
-            <a:endParaRPr lang="en-US" sz="2400" dirty="0"/>
+          </a:p>
+          <a:p>
+            <a:endParaRPr lang="en-US" sz="2000" dirty="0" smtClean="0"/>
           </a:p>
         </p:txBody>
       </p:sp>
     </p:spTree>
-    <p:extLst>
-      <p:ext uri="{BB962C8B-B14F-4D97-AF65-F5344CB8AC3E}">
-        <p14:creationId xmlns:p14="http://schemas.microsoft.com/office/powerpoint/2010/main" val="3772113046"/>
-      </p:ext>
-    </p:extLst>
   </p:cSld>
   <p:clrMapOvr>
     <a:masterClrMapping/>
   </p:clrMapOvr>
-  <p:timing>
-    <p:tnLst>
-      <p:par>
-        <p:cTn id="1" dur="indefinite" restart="never" nodeType="tmRoot"/>
-      </p:par>
-    </p:tnLst>
-  </p:timing>
 </p:sld>
 </file>
 
@@ -4654,29 +5974,6 @@
       </p:grpSpPr>
       <p:sp>
         <p:nvSpPr>
-          <p:cNvPr id="2" name="Title 1"/>
-          <p:cNvSpPr>
-            <a:spLocks noGrp="1"/>
-          </p:cNvSpPr>
-          <p:nvPr>
-            <p:ph type="title"/>
-          </p:nvPr>
-        </p:nvSpPr>
-        <p:spPr/>
-        <p:txBody>
-          <a:bodyPr/>
-          <a:lstStyle/>
-          <a:p>
-            <a:r>
-              <a:rPr lang="en-US" dirty="0" smtClean="0"/>
-              <a:t>Score Test Code</a:t>
-            </a:r>
-            <a:endParaRPr lang="en-US" dirty="0"/>
-          </a:p>
-        </p:txBody>
-      </p:sp>
-      <p:sp>
-        <p:nvSpPr>
           <p:cNvPr id="3" name="Content Placeholder 2"/>
           <p:cNvSpPr>
             <a:spLocks noGrp="1"/>
@@ -4687,127 +5984,224 @@
         </p:nvSpPr>
         <p:spPr>
           <a:xfrm>
-            <a:off x="457200" y="1219200"/>
-            <a:ext cx="8229600" cy="5410200"/>
+            <a:off x="533400" y="457200"/>
+            <a:ext cx="8229600" cy="4525963"/>
           </a:xfrm>
         </p:spPr>
         <p:txBody>
           <a:bodyPr/>
           <a:lstStyle/>
           <a:p>
-            <a:pPr marL="0" indent="0">
-              <a:buNone/>
-            </a:pPr>
-            <a:r>
-              <a:rPr lang="en-US" sz="2400" dirty="0"/>
-              <a:t> [</a:t>
-            </a:r>
-            <a:r>
-              <a:rPr lang="en-US" sz="2400" dirty="0" err="1"/>
+            <a:r>
+              <a:rPr lang="en-US" sz="2000" dirty="0" smtClean="0"/>
+              <a:t>        </a:t>
+            </a:r>
+            <a:r>
+              <a:rPr lang="en-US" sz="2000" dirty="0" smtClean="0"/>
+              <a:t>[</a:t>
+            </a:r>
+            <a:r>
+              <a:rPr lang="en-US" sz="2000" dirty="0" err="1" smtClean="0"/>
               <a:t>TestMethod</a:t>
             </a:r>
             <a:r>
-              <a:rPr lang="en-US" sz="2400" dirty="0"/>
-              <a:t>]</a:t>
-            </a:r>
-          </a:p>
-          <a:p>
-            <a:pPr marL="0" indent="0">
-              <a:buNone/>
-            </a:pPr>
-            <a:r>
-              <a:rPr lang="en-US" sz="2400" dirty="0"/>
+              <a:rPr lang="en-US" sz="2000" dirty="0" smtClean="0"/>
+              <a:t>()]</a:t>
+            </a:r>
+          </a:p>
+          <a:p>
+            <a:r>
+              <a:rPr lang="en-US" sz="2000" dirty="0" smtClean="0"/>
               <a:t>        public void </a:t>
             </a:r>
             <a:r>
-              <a:rPr lang="en-US" sz="2400" dirty="0" err="1"/>
-              <a:t>ScoreValue_Test</a:t>
-            </a:r>
-            <a:r>
-              <a:rPr lang="en-US" sz="2400" dirty="0"/>
+              <a:rPr lang="en-US" sz="2000" dirty="0" err="1" smtClean="0"/>
+              <a:t>XTest</a:t>
+            </a:r>
+            <a:r>
+              <a:rPr lang="en-US" sz="2000" dirty="0" smtClean="0"/>
               <a:t>()</a:t>
             </a:r>
           </a:p>
           <a:p>
-            <a:pPr marL="0" indent="0">
-              <a:buNone/>
-            </a:pPr>
-            <a:r>
-              <a:rPr lang="en-US" sz="2400" dirty="0"/>
+            <a:r>
+              <a:rPr lang="en-US" sz="2000" dirty="0" smtClean="0"/>
               <a:t>        {</a:t>
             </a:r>
           </a:p>
           <a:p>
-            <a:pPr marL="0" indent="0">
-              <a:buNone/>
-            </a:pPr>
-            <a:r>
-              <a:rPr lang="en-US" sz="2400" dirty="0"/>
+            <a:r>
+              <a:rPr lang="en-US" sz="2000" dirty="0" smtClean="0"/>
               <a:t>            </a:t>
             </a:r>
             <a:r>
-              <a:rPr lang="en-US" sz="2400" dirty="0" err="1"/>
-              <a:t>hud.score</a:t>
-            </a:r>
-            <a:r>
-              <a:rPr lang="en-US" sz="2400" dirty="0"/>
-              <a:t> = 0;</a:t>
-            </a:r>
-          </a:p>
-          <a:p>
-            <a:pPr marL="0" indent="0">
-              <a:buNone/>
-            </a:pPr>
-            <a:r>
-              <a:rPr lang="en-US" sz="2400" dirty="0"/>
+              <a:rPr lang="en-US" sz="2000" dirty="0" err="1" smtClean="0"/>
+              <a:t>int</a:t>
+            </a:r>
+            <a:r>
+              <a:rPr lang="en-US" sz="2000" dirty="0" smtClean="0"/>
+              <a:t> x = 50;</a:t>
+            </a:r>
+          </a:p>
+          <a:p>
+            <a:r>
+              <a:rPr lang="en-US" sz="2000" dirty="0" smtClean="0"/>
               <a:t>            </a:t>
             </a:r>
             <a:r>
-              <a:rPr lang="en-US" sz="2400" dirty="0" err="1"/>
+              <a:rPr lang="en-US" sz="2000" dirty="0" err="1" smtClean="0"/>
+              <a:t>target.X</a:t>
+            </a:r>
+            <a:r>
+              <a:rPr lang="en-US" sz="2000" dirty="0" smtClean="0"/>
+              <a:t> = 50;</a:t>
+            </a:r>
+          </a:p>
+          <a:p>
+            <a:r>
+              <a:rPr lang="en-US" sz="2000" dirty="0" smtClean="0"/>
+              <a:t>            </a:t>
+            </a:r>
+            <a:r>
+              <a:rPr lang="en-US" sz="2000" dirty="0" err="1" smtClean="0"/>
               <a:t>Assert.AreEqual</a:t>
             </a:r>
             <a:r>
-              <a:rPr lang="en-US" sz="2400" dirty="0"/>
-              <a:t>(0, </a:t>
-            </a:r>
-            <a:r>
-              <a:rPr lang="en-US" sz="2400" dirty="0" err="1"/>
-              <a:t>hud.score</a:t>
-            </a:r>
-            <a:r>
-              <a:rPr lang="en-US" sz="2400" dirty="0"/>
+              <a:rPr lang="en-US" sz="2000" dirty="0" smtClean="0"/>
+              <a:t>(x, </a:t>
+            </a:r>
+            <a:r>
+              <a:rPr lang="en-US" sz="2000" dirty="0" err="1" smtClean="0"/>
+              <a:t>target.X</a:t>
+            </a:r>
+            <a:r>
+              <a:rPr lang="en-US" sz="2000" dirty="0" smtClean="0"/>
               <a:t>);</a:t>
             </a:r>
           </a:p>
           <a:p>
-            <a:pPr marL="0" indent="0">
-              <a:buNone/>
-            </a:pPr>
-            <a:r>
-              <a:rPr lang="en-US" sz="2400" dirty="0"/>
+            <a:r>
+              <a:rPr lang="en-US" sz="2000" dirty="0" smtClean="0"/>
               <a:t>        }</a:t>
             </a:r>
-            <a:endParaRPr lang="en-US" sz="2400" dirty="0"/>
+          </a:p>
+          <a:p>
+            <a:endParaRPr lang="en-US" sz="2000" dirty="0" smtClean="0"/>
+          </a:p>
+          <a:p>
+            <a:r>
+              <a:rPr lang="en-US" sz="2000" dirty="0" smtClean="0"/>
+              <a:t>        </a:t>
+            </a:r>
+            <a:r>
+              <a:rPr lang="en-US" sz="2000" dirty="0" smtClean="0"/>
+              <a:t>[</a:t>
+            </a:r>
+            <a:r>
+              <a:rPr lang="en-US" sz="2000" dirty="0" err="1" smtClean="0"/>
+              <a:t>TestMethod</a:t>
+            </a:r>
+            <a:r>
+              <a:rPr lang="en-US" sz="2000" dirty="0" smtClean="0"/>
+              <a:t>()]</a:t>
+            </a:r>
+          </a:p>
+          <a:p>
+            <a:r>
+              <a:rPr lang="en-US" sz="2000" dirty="0" smtClean="0"/>
+              <a:t>        public void </a:t>
+            </a:r>
+            <a:r>
+              <a:rPr lang="en-US" sz="2000" dirty="0" err="1" smtClean="0"/>
+              <a:t>YTest</a:t>
+            </a:r>
+            <a:r>
+              <a:rPr lang="en-US" sz="2000" dirty="0" smtClean="0"/>
+              <a:t>()</a:t>
+            </a:r>
+          </a:p>
+          <a:p>
+            <a:r>
+              <a:rPr lang="en-US" sz="2000" dirty="0" smtClean="0"/>
+              <a:t>        {</a:t>
+            </a:r>
+          </a:p>
+          <a:p>
+            <a:r>
+              <a:rPr lang="en-US" sz="2000" dirty="0" smtClean="0"/>
+              <a:t>            </a:t>
+            </a:r>
+            <a:r>
+              <a:rPr lang="en-US" sz="2000" dirty="0" err="1" smtClean="0"/>
+              <a:t>int</a:t>
+            </a:r>
+            <a:r>
+              <a:rPr lang="en-US" sz="2000" dirty="0" smtClean="0"/>
+              <a:t> y = 50;</a:t>
+            </a:r>
+          </a:p>
+          <a:p>
+            <a:r>
+              <a:rPr lang="en-US" sz="2000" dirty="0" smtClean="0"/>
+              <a:t>            </a:t>
+            </a:r>
+            <a:r>
+              <a:rPr lang="en-US" sz="2000" dirty="0" err="1" smtClean="0"/>
+              <a:t>target.Y</a:t>
+            </a:r>
+            <a:r>
+              <a:rPr lang="en-US" sz="2000" dirty="0" smtClean="0"/>
+              <a:t> = 50;</a:t>
+            </a:r>
+          </a:p>
+          <a:p>
+            <a:r>
+              <a:rPr lang="en-US" sz="2000" dirty="0" smtClean="0"/>
+              <a:t>            </a:t>
+            </a:r>
+            <a:r>
+              <a:rPr lang="en-US" sz="2000" dirty="0" err="1" smtClean="0"/>
+              <a:t>Assert.AreEqual</a:t>
+            </a:r>
+            <a:r>
+              <a:rPr lang="en-US" sz="2000" dirty="0" smtClean="0"/>
+              <a:t>(y, </a:t>
+            </a:r>
+            <a:r>
+              <a:rPr lang="en-US" sz="2000" dirty="0" err="1" smtClean="0"/>
+              <a:t>target.Y</a:t>
+            </a:r>
+            <a:r>
+              <a:rPr lang="en-US" sz="2000" dirty="0" smtClean="0"/>
+              <a:t>);</a:t>
+            </a:r>
+          </a:p>
+          <a:p>
+            <a:r>
+              <a:rPr lang="en-US" sz="2000" dirty="0" smtClean="0"/>
+              <a:t>        }</a:t>
+            </a:r>
+          </a:p>
+          <a:p>
+            <a:r>
+              <a:rPr lang="en-US" sz="2000" dirty="0" smtClean="0"/>
+              <a:t>    }</a:t>
+            </a:r>
+          </a:p>
+          <a:p>
+            <a:r>
+              <a:rPr lang="en-US" sz="2000" dirty="0" smtClean="0"/>
+              <a:t>}</a:t>
+            </a:r>
+            <a:endParaRPr lang="en-US" sz="2000" dirty="0"/>
           </a:p>
         </p:txBody>
       </p:sp>
     </p:spTree>
-    <p:extLst>
-      <p:ext uri="{BB962C8B-B14F-4D97-AF65-F5344CB8AC3E}">
-        <p14:creationId xmlns:p14="http://schemas.microsoft.com/office/powerpoint/2010/main" val="755878279"/>
-      </p:ext>
-    </p:extLst>
   </p:cSld>
   <p:clrMapOvr>
     <a:masterClrMapping/>
   </p:clrMapOvr>
-  <p:timing>
-    <p:tnLst>
-      <p:par>
-        <p:cTn id="1" dur="indefinite" restart="never" nodeType="tmRoot"/>
-      </p:par>
-    </p:tnLst>
-  </p:timing>
 </p:sld>
 </file>
 
@@ -4845,7 +6239,7 @@
           <a:p>
             <a:r>
               <a:rPr lang="en-US" dirty="0" smtClean="0"/>
-              <a:t>Level Test Code</a:t>
+              <a:t>Collisions Test Code</a:t>
             </a:r>
             <a:endParaRPr lang="en-US" dirty="0"/>
           </a:p>
@@ -4866,111 +6260,22 @@
           <a:bodyPr/>
           <a:lstStyle/>
           <a:p>
-            <a:pPr marL="0" indent="0">
-              <a:buNone/>
-            </a:pPr>
-            <a:r>
-              <a:rPr lang="en-US" sz="2400" dirty="0"/>
-              <a:t> [</a:t>
-            </a:r>
-            <a:r>
-              <a:rPr lang="en-US" sz="2400" dirty="0" err="1"/>
-              <a:t>TestMethod</a:t>
-            </a:r>
-            <a:r>
-              <a:rPr lang="en-US" sz="2400" dirty="0"/>
-              <a:t>]</a:t>
-            </a:r>
-          </a:p>
-          <a:p>
-            <a:pPr marL="0" indent="0">
-              <a:buNone/>
-            </a:pPr>
-            <a:r>
-              <a:rPr lang="en-US" sz="2400" dirty="0"/>
-              <a:t>        public void </a:t>
-            </a:r>
-            <a:r>
-              <a:rPr lang="en-US" sz="2400" dirty="0" err="1"/>
-              <a:t>LevelValue_Test</a:t>
-            </a:r>
-            <a:r>
-              <a:rPr lang="en-US" sz="2400" dirty="0"/>
-              <a:t>()</a:t>
-            </a:r>
-          </a:p>
-          <a:p>
-            <a:pPr marL="0" indent="0">
-              <a:buNone/>
-            </a:pPr>
-            <a:r>
-              <a:rPr lang="en-US" sz="2400" dirty="0"/>
-              <a:t>        {</a:t>
-            </a:r>
-          </a:p>
-          <a:p>
-            <a:pPr marL="0" indent="0">
-              <a:buNone/>
-            </a:pPr>
-            <a:r>
-              <a:rPr lang="en-US" sz="2400" dirty="0"/>
-              <a:t>            </a:t>
-            </a:r>
-            <a:r>
-              <a:rPr lang="en-US" sz="2400" dirty="0" err="1"/>
-              <a:t>hud.level</a:t>
-            </a:r>
-            <a:r>
-              <a:rPr lang="en-US" sz="2400" dirty="0"/>
-              <a:t> = 1;</a:t>
-            </a:r>
-          </a:p>
-          <a:p>
-            <a:pPr marL="0" indent="0">
-              <a:buNone/>
-            </a:pPr>
-            <a:r>
-              <a:rPr lang="en-US" sz="2400" dirty="0"/>
-              <a:t>            </a:t>
-            </a:r>
-            <a:r>
-              <a:rPr lang="en-US" sz="2400" dirty="0" err="1"/>
-              <a:t>Assert.AreEqual</a:t>
-            </a:r>
-            <a:r>
-              <a:rPr lang="en-US" sz="2400" dirty="0"/>
-              <a:t>(1, </a:t>
-            </a:r>
-            <a:r>
-              <a:rPr lang="en-US" sz="2400" dirty="0" err="1"/>
-              <a:t>hud.level</a:t>
-            </a:r>
-            <a:r>
-              <a:rPr lang="en-US" sz="2400" dirty="0"/>
-              <a:t>);</a:t>
-            </a:r>
-          </a:p>
-          <a:p>
-            <a:pPr marL="0" indent="0">
-              <a:buNone/>
-            </a:pPr>
-            <a:r>
-              <a:rPr lang="en-US" sz="2400" dirty="0"/>
-              <a:t>        }</a:t>
-            </a:r>
+            <a:endParaRPr lang="en-US" dirty="0"/>
           </a:p>
         </p:txBody>
       </p:sp>
     </p:spTree>
-    <p:extLst>
-      <p:ext uri="{BB962C8B-B14F-4D97-AF65-F5344CB8AC3E}">
-        <p14:creationId xmlns:p14="http://schemas.microsoft.com/office/powerpoint/2010/main" val="2934486822"/>
-      </p:ext>
-    </p:extLst>
   </p:cSld>
   <p:clrMapOvr>
     <a:masterClrMapping/>
   </p:clrMapOvr>
+  <p:timing>
+    <p:tnLst>
+      <p:par>
+        <p:cTn id="1" dur="indefinite" restart="never" nodeType="tmRoot"/>
+      </p:par>
+    </p:tnLst>
+  </p:timing>
 </p:sld>
 </file>
 

</xml_diff>